<commit_message>
tdf#117088 Use shortening for vertical text only
Change-Id: I399111123738f3b8dc4406010cf1a5abd6ae8d97
</commit_message>
<xml_diff>
--- a/chart2/qa/extras/data/pptx/tdf116163.pptx
+++ b/chart2/qa/extras/data/pptx/tdf116163.pptx
@@ -115,7 +115,7 @@
 <file path=ppt/charts/chart1.xml><?xml version="1.0" encoding="utf-8"?>
 <c:chartSpace xmlns:c="http://schemas.openxmlformats.org/drawingml/2006/chart" xmlns:a="http://schemas.openxmlformats.org/drawingml/2006/main" xmlns:r="http://schemas.openxmlformats.org/officeDocument/2006/relationships" xmlns:c16r2="http://schemas.microsoft.com/office/drawing/2015/06/chart">
   <c:date1904 val="0"/>
-  <c:lang val="pl-PL"/>
+  <c:lang val="en-US"/>
   <c:roundedCorners val="0"/>
   <mc:AlternateContent xmlns:mc="http://schemas.openxmlformats.org/markup-compatibility/2006">
     <mc:Choice xmlns:c14="http://schemas.microsoft.com/office/drawing/2007/8/2/chart" Requires="c14">
@@ -274,7 +274,7 @@
                 <a:cs typeface="Arial" panose="020B0604020202020204" pitchFamily="34" charset="0"/>
               </a:defRPr>
             </a:pPr>
-            <a:endParaRPr lang="pl-PL"/>
+            <a:endParaRPr lang="en-US"/>
           </a:p>
         </c:txPr>
         <c:crossAx val="545234495"/>
@@ -346,7 +346,249 @@
       <a:pPr>
         <a:defRPr/>
       </a:pPr>
-      <a:endParaRPr lang="pl-PL"/>
+      <a:endParaRPr lang="en-US"/>
+    </a:p>
+  </c:txPr>
+  <c:externalData r:id="rId3">
+    <c:autoUpdate val="0"/>
+  </c:externalData>
+</c:chartSpace>
+</file>
+
+<file path=ppt/charts/chart2.xml><?xml version="1.0" encoding="utf-8"?>
+<c:chartSpace xmlns:c="http://schemas.openxmlformats.org/drawingml/2006/chart" xmlns:a="http://schemas.openxmlformats.org/drawingml/2006/main" xmlns:r="http://schemas.openxmlformats.org/officeDocument/2006/relationships" xmlns:c16r2="http://schemas.microsoft.com/office/drawing/2015/06/chart">
+  <c:date1904 val="0"/>
+  <c:lang val="en-US"/>
+  <c:roundedCorners val="0"/>
+  <mc:AlternateContent xmlns:mc="http://schemas.openxmlformats.org/markup-compatibility/2006">
+    <mc:Choice xmlns:c14="http://schemas.microsoft.com/office/drawing/2007/8/2/chart" Requires="c14">
+      <c14:style val="102"/>
+    </mc:Choice>
+    <mc:Fallback>
+      <c:style val="2"/>
+    </mc:Fallback>
+  </mc:AlternateContent>
+  <c:chart>
+    <c:autoTitleDeleted val="1"/>
+    <c:plotArea>
+      <c:layout>
+        <c:manualLayout>
+          <c:layoutTarget val="inner"/>
+          <c:xMode val="edge"/>
+          <c:yMode val="edge"/>
+          <c:x val="0.24776744336263179"/>
+          <c:y val="5.156249682809444E-2"/>
+          <c:w val="0.75223255663736821"/>
+          <c:h val="0.57737332923847473"/>
+        </c:manualLayout>
+      </c:layout>
+      <c:barChart>
+        <c:barDir val="bar"/>
+        <c:grouping val="clustered"/>
+        <c:varyColors val="0"/>
+        <c:ser>
+          <c:idx val="0"/>
+          <c:order val="0"/>
+          <c:tx>
+            <c:strRef>
+              <c:f>Arkusz1!$B$1</c:f>
+              <c:strCache>
+                <c:ptCount val="1"/>
+                <c:pt idx="0">
+                  <c:v>Series 1</c:v>
+                </c:pt>
+              </c:strCache>
+            </c:strRef>
+          </c:tx>
+          <c:spPr>
+            <a:solidFill>
+              <a:schemeClr val="accent1"/>
+            </a:solidFill>
+            <a:ln>
+              <a:noFill/>
+            </a:ln>
+            <a:effectLst/>
+          </c:spPr>
+          <c:invertIfNegative val="0"/>
+          <c:cat>
+            <c:strRef>
+              <c:f>Arkusz1!$A$2:$A$6</c:f>
+              <c:strCache>
+                <c:ptCount val="5"/>
+                <c:pt idx="0">
+                  <c:v>Aaaa</c:v>
+                </c:pt>
+                <c:pt idx="1">
+                  <c:v>Bbbbbbb</c:v>
+                </c:pt>
+                <c:pt idx="2">
+                  <c:v>Ccc</c:v>
+                </c:pt>
+                <c:pt idx="3">
+                  <c:v>Ddddddddddddd</c:v>
+                </c:pt>
+                <c:pt idx="4">
+                  <c:v>Eeiieeee</c:v>
+                </c:pt>
+              </c:strCache>
+            </c:strRef>
+          </c:cat>
+          <c:val>
+            <c:numRef>
+              <c:f>Arkusz1!$B$2:$B$6</c:f>
+              <c:numCache>
+                <c:formatCode>#,##0.0_);\(#,##0.0\);#,##0.0_);@_)</c:formatCode>
+                <c:ptCount val="5"/>
+                <c:pt idx="0">
+                  <c:v>15</c:v>
+                </c:pt>
+                <c:pt idx="1">
+                  <c:v>12</c:v>
+                </c:pt>
+                <c:pt idx="2">
+                  <c:v>10</c:v>
+                </c:pt>
+                <c:pt idx="3">
+                  <c:v>7</c:v>
+                </c:pt>
+                <c:pt idx="4">
+                  <c:v>5.0999999999999996</c:v>
+                </c:pt>
+              </c:numCache>
+            </c:numRef>
+          </c:val>
+          <c:extLst>
+            <c:ext xmlns:c16="http://schemas.microsoft.com/office/drawing/2014/chart" uri="{C3380CC4-5D6E-409C-BE32-E72D297353CC}">
+              <c16:uniqueId val="{00000000-7698-4B65-BA1E-BD38689F4A2A}"/>
+            </c:ext>
+          </c:extLst>
+        </c:ser>
+        <c:dLbls>
+          <c:showLegendKey val="0"/>
+          <c:showVal val="0"/>
+          <c:showCatName val="0"/>
+          <c:showSerName val="0"/>
+          <c:showPercent val="0"/>
+          <c:showBubbleSize val="0"/>
+        </c:dLbls>
+        <c:gapWidth val="219"/>
+        <c:axId val="545578703"/>
+        <c:axId val="545234495"/>
+      </c:barChart>
+      <c:catAx>
+        <c:axId val="545578703"/>
+        <c:scaling>
+          <c:orientation val="minMax"/>
+        </c:scaling>
+        <c:delete val="0"/>
+        <c:axPos val="l"/>
+        <c:numFmt formatCode="General" sourceLinked="1"/>
+        <c:majorTickMark val="none"/>
+        <c:minorTickMark val="none"/>
+        <c:tickLblPos val="nextTo"/>
+        <c:spPr>
+          <a:noFill/>
+          <a:ln w="9525" cap="flat" cmpd="sng" algn="ctr">
+            <a:solidFill>
+              <a:schemeClr val="tx1">
+                <a:lumMod val="15000"/>
+                <a:lumOff val="85000"/>
+              </a:schemeClr>
+            </a:solidFill>
+            <a:round/>
+          </a:ln>
+          <a:effectLst/>
+        </c:spPr>
+        <c:txPr>
+          <a:bodyPr rot="0" spcFirstLastPara="1" vertOverflow="ellipsis" vert="horz" wrap="square" anchor="ctr" anchorCtr="1"/>
+          <a:lstStyle/>
+          <a:p>
+            <a:pPr>
+              <a:defRPr sz="1800" b="0" i="0" u="none" strike="noStrike" kern="1200" baseline="0">
+                <a:solidFill>
+                  <a:schemeClr val="tx1">
+                    <a:lumMod val="65000"/>
+                    <a:lumOff val="35000"/>
+                  </a:schemeClr>
+                </a:solidFill>
+                <a:latin typeface="Arial" panose="020B0604020202020204" pitchFamily="34" charset="0"/>
+                <a:ea typeface="+mn-ea"/>
+                <a:cs typeface="Arial" panose="020B0604020202020204" pitchFamily="34" charset="0"/>
+              </a:defRPr>
+            </a:pPr>
+            <a:endParaRPr lang="en-US"/>
+          </a:p>
+        </c:txPr>
+        <c:crossAx val="545234495"/>
+        <c:crosses val="autoZero"/>
+        <c:auto val="1"/>
+        <c:lblAlgn val="ctr"/>
+        <c:lblOffset val="100"/>
+        <c:noMultiLvlLbl val="0"/>
+      </c:catAx>
+      <c:valAx>
+        <c:axId val="545234495"/>
+        <c:scaling>
+          <c:orientation val="minMax"/>
+        </c:scaling>
+        <c:delete val="1"/>
+        <c:axPos val="b"/>
+        <c:majorGridlines>
+          <c:spPr>
+            <a:ln w="9525" cap="flat" cmpd="sng" algn="ctr">
+              <a:solidFill>
+                <a:schemeClr val="tx1">
+                  <a:lumMod val="15000"/>
+                  <a:lumOff val="85000"/>
+                </a:schemeClr>
+              </a:solidFill>
+              <a:round/>
+            </a:ln>
+            <a:effectLst/>
+          </c:spPr>
+        </c:majorGridlines>
+        <c:numFmt formatCode="#,##0.0_);\(#,##0.0\);#,##0.0_);@_)" sourceLinked="1"/>
+        <c:majorTickMark val="none"/>
+        <c:minorTickMark val="none"/>
+        <c:tickLblPos val="nextTo"/>
+        <c:crossAx val="545578703"/>
+        <c:crosses val="autoZero"/>
+        <c:crossBetween val="between"/>
+      </c:valAx>
+      <c:spPr>
+        <a:noFill/>
+        <a:ln>
+          <a:noFill/>
+        </a:ln>
+        <a:effectLst/>
+      </c:spPr>
+    </c:plotArea>
+    <c:plotVisOnly val="1"/>
+    <c:dispBlanksAs val="gap"/>
+    <c:extLst>
+      <c:ext xmlns:c16r3="http://schemas.microsoft.com/office/drawing/2017/03/chart" uri="{56B9EC1D-385E-4148-901F-78D8002777C0}">
+        <c16r3:dataDisplayOptions16>
+          <c16r3:dispNaAsBlank val="1"/>
+        </c16r3:dataDisplayOptions16>
+      </c:ext>
+    </c:extLst>
+    <c:showDLblsOverMax val="0"/>
+  </c:chart>
+  <c:spPr>
+    <a:noFill/>
+    <a:ln>
+      <a:noFill/>
+    </a:ln>
+    <a:effectLst/>
+  </c:spPr>
+  <c:txPr>
+    <a:bodyPr/>
+    <a:lstStyle/>
+    <a:p>
+      <a:pPr>
+        <a:defRPr/>
+      </a:pPr>
+      <a:endParaRPr lang="en-US"/>
     </a:p>
   </c:txPr>
   <c:externalData r:id="rId3">
@@ -395,7 +637,550 @@
 </cs:colorStyle>
 </file>
 
+<file path=ppt/charts/colors2.xml><?xml version="1.0" encoding="utf-8"?>
+<cs:colorStyle xmlns:cs="http://schemas.microsoft.com/office/drawing/2012/chartStyle" xmlns:a="http://schemas.openxmlformats.org/drawingml/2006/main" meth="cycle" id="10">
+  <a:schemeClr val="accent1"/>
+  <a:schemeClr val="accent2"/>
+  <a:schemeClr val="accent3"/>
+  <a:schemeClr val="accent4"/>
+  <a:schemeClr val="accent5"/>
+  <a:schemeClr val="accent6"/>
+  <cs:variation/>
+  <cs:variation>
+    <a:lumMod val="60000"/>
+  </cs:variation>
+  <cs:variation>
+    <a:lumMod val="80000"/>
+    <a:lumOff val="20000"/>
+  </cs:variation>
+  <cs:variation>
+    <a:lumMod val="80000"/>
+  </cs:variation>
+  <cs:variation>
+    <a:lumMod val="60000"/>
+    <a:lumOff val="40000"/>
+  </cs:variation>
+  <cs:variation>
+    <a:lumMod val="50000"/>
+  </cs:variation>
+  <cs:variation>
+    <a:lumMod val="70000"/>
+    <a:lumOff val="30000"/>
+  </cs:variation>
+  <cs:variation>
+    <a:lumMod val="70000"/>
+  </cs:variation>
+  <cs:variation>
+    <a:lumMod val="50000"/>
+    <a:lumOff val="50000"/>
+  </cs:variation>
+</cs:colorStyle>
+</file>
+
 <file path=ppt/charts/style1.xml><?xml version="1.0" encoding="utf-8"?>
+<cs:chartStyle xmlns:cs="http://schemas.microsoft.com/office/drawing/2012/chartStyle" xmlns:a="http://schemas.openxmlformats.org/drawingml/2006/main" id="201">
+  <cs:axisTitle>
+    <cs:lnRef idx="0"/>
+    <cs:fillRef idx="0"/>
+    <cs:effectRef idx="0"/>
+    <cs:fontRef idx="minor">
+      <a:schemeClr val="tx1">
+        <a:lumMod val="65000"/>
+        <a:lumOff val="35000"/>
+      </a:schemeClr>
+    </cs:fontRef>
+    <cs:defRPr sz="1330" kern="1200"/>
+  </cs:axisTitle>
+  <cs:categoryAxis>
+    <cs:lnRef idx="0"/>
+    <cs:fillRef idx="0"/>
+    <cs:effectRef idx="0"/>
+    <cs:fontRef idx="minor">
+      <a:schemeClr val="tx1">
+        <a:lumMod val="65000"/>
+        <a:lumOff val="35000"/>
+      </a:schemeClr>
+    </cs:fontRef>
+    <cs:spPr>
+      <a:ln w="9525" cap="flat" cmpd="sng" algn="ctr">
+        <a:solidFill>
+          <a:schemeClr val="tx1">
+            <a:lumMod val="15000"/>
+            <a:lumOff val="85000"/>
+          </a:schemeClr>
+        </a:solidFill>
+        <a:round/>
+      </a:ln>
+    </cs:spPr>
+    <cs:defRPr sz="1197" kern="1200"/>
+  </cs:categoryAxis>
+  <cs:chartArea mods="allowNoFillOverride allowNoLineOverride">
+    <cs:lnRef idx="0"/>
+    <cs:fillRef idx="0"/>
+    <cs:effectRef idx="0"/>
+    <cs:fontRef idx="minor">
+      <a:schemeClr val="tx1"/>
+    </cs:fontRef>
+    <cs:spPr>
+      <a:solidFill>
+        <a:schemeClr val="bg1"/>
+      </a:solidFill>
+      <a:ln w="9525" cap="flat" cmpd="sng" algn="ctr">
+        <a:solidFill>
+          <a:schemeClr val="tx1">
+            <a:lumMod val="15000"/>
+            <a:lumOff val="85000"/>
+          </a:schemeClr>
+        </a:solidFill>
+        <a:round/>
+      </a:ln>
+    </cs:spPr>
+    <cs:defRPr sz="1330" kern="1200"/>
+  </cs:chartArea>
+  <cs:dataLabel>
+    <cs:lnRef idx="0"/>
+    <cs:fillRef idx="0"/>
+    <cs:effectRef idx="0"/>
+    <cs:fontRef idx="minor">
+      <a:schemeClr val="tx1">
+        <a:lumMod val="75000"/>
+        <a:lumOff val="25000"/>
+      </a:schemeClr>
+    </cs:fontRef>
+    <cs:defRPr sz="1197" kern="1200"/>
+  </cs:dataLabel>
+  <cs:dataLabelCallout>
+    <cs:lnRef idx="0"/>
+    <cs:fillRef idx="0"/>
+    <cs:effectRef idx="0"/>
+    <cs:fontRef idx="minor">
+      <a:schemeClr val="dk1">
+        <a:lumMod val="65000"/>
+        <a:lumOff val="35000"/>
+      </a:schemeClr>
+    </cs:fontRef>
+    <cs:spPr>
+      <a:solidFill>
+        <a:schemeClr val="lt1"/>
+      </a:solidFill>
+      <a:ln>
+        <a:solidFill>
+          <a:schemeClr val="dk1">
+            <a:lumMod val="25000"/>
+            <a:lumOff val="75000"/>
+          </a:schemeClr>
+        </a:solidFill>
+      </a:ln>
+    </cs:spPr>
+    <cs:defRPr sz="1197" kern="1200"/>
+    <cs:bodyPr rot="0" spcFirstLastPara="1" vertOverflow="clip" horzOverflow="clip" vert="horz" wrap="square" lIns="36576" tIns="18288" rIns="36576" bIns="18288" anchor="ctr" anchorCtr="1">
+      <a:spAutoFit/>
+    </cs:bodyPr>
+  </cs:dataLabelCallout>
+  <cs:dataPoint>
+    <cs:lnRef idx="0"/>
+    <cs:fillRef idx="1">
+      <cs:styleClr val="auto"/>
+    </cs:fillRef>
+    <cs:effectRef idx="0"/>
+    <cs:fontRef idx="minor">
+      <a:schemeClr val="tx1"/>
+    </cs:fontRef>
+  </cs:dataPoint>
+  <cs:dataPoint3D>
+    <cs:lnRef idx="0"/>
+    <cs:fillRef idx="1">
+      <cs:styleClr val="auto"/>
+    </cs:fillRef>
+    <cs:effectRef idx="0"/>
+    <cs:fontRef idx="minor">
+      <a:schemeClr val="tx1"/>
+    </cs:fontRef>
+  </cs:dataPoint3D>
+  <cs:dataPointLine>
+    <cs:lnRef idx="0">
+      <cs:styleClr val="auto"/>
+    </cs:lnRef>
+    <cs:fillRef idx="1"/>
+    <cs:effectRef idx="0"/>
+    <cs:fontRef idx="minor">
+      <a:schemeClr val="tx1"/>
+    </cs:fontRef>
+    <cs:spPr>
+      <a:ln w="28575" cap="rnd">
+        <a:solidFill>
+          <a:schemeClr val="phClr"/>
+        </a:solidFill>
+        <a:round/>
+      </a:ln>
+    </cs:spPr>
+  </cs:dataPointLine>
+  <cs:dataPointMarker>
+    <cs:lnRef idx="0">
+      <cs:styleClr val="auto"/>
+    </cs:lnRef>
+    <cs:fillRef idx="1">
+      <cs:styleClr val="auto"/>
+    </cs:fillRef>
+    <cs:effectRef idx="0"/>
+    <cs:fontRef idx="minor">
+      <a:schemeClr val="tx1"/>
+    </cs:fontRef>
+    <cs:spPr>
+      <a:ln w="9525">
+        <a:solidFill>
+          <a:schemeClr val="phClr"/>
+        </a:solidFill>
+      </a:ln>
+    </cs:spPr>
+  </cs:dataPointMarker>
+  <cs:dataPointMarkerLayout symbol="circle" size="5"/>
+  <cs:dataPointWireframe>
+    <cs:lnRef idx="0">
+      <cs:styleClr val="auto"/>
+    </cs:lnRef>
+    <cs:fillRef idx="1"/>
+    <cs:effectRef idx="0"/>
+    <cs:fontRef idx="minor">
+      <a:schemeClr val="tx1"/>
+    </cs:fontRef>
+    <cs:spPr>
+      <a:ln w="9525" cap="rnd">
+        <a:solidFill>
+          <a:schemeClr val="phClr"/>
+        </a:solidFill>
+        <a:round/>
+      </a:ln>
+    </cs:spPr>
+  </cs:dataPointWireframe>
+  <cs:dataTable>
+    <cs:lnRef idx="0"/>
+    <cs:fillRef idx="0"/>
+    <cs:effectRef idx="0"/>
+    <cs:fontRef idx="minor">
+      <a:schemeClr val="tx1">
+        <a:lumMod val="65000"/>
+        <a:lumOff val="35000"/>
+      </a:schemeClr>
+    </cs:fontRef>
+    <cs:spPr>
+      <a:noFill/>
+      <a:ln w="9525" cap="flat" cmpd="sng" algn="ctr">
+        <a:solidFill>
+          <a:schemeClr val="tx1">
+            <a:lumMod val="15000"/>
+            <a:lumOff val="85000"/>
+          </a:schemeClr>
+        </a:solidFill>
+        <a:round/>
+      </a:ln>
+    </cs:spPr>
+    <cs:defRPr sz="1197" kern="1200"/>
+  </cs:dataTable>
+  <cs:downBar>
+    <cs:lnRef idx="0"/>
+    <cs:fillRef idx="0"/>
+    <cs:effectRef idx="0"/>
+    <cs:fontRef idx="minor">
+      <a:schemeClr val="dk1"/>
+    </cs:fontRef>
+    <cs:spPr>
+      <a:solidFill>
+        <a:schemeClr val="dk1">
+          <a:lumMod val="65000"/>
+          <a:lumOff val="35000"/>
+        </a:schemeClr>
+      </a:solidFill>
+      <a:ln w="9525">
+        <a:solidFill>
+          <a:schemeClr val="tx1">
+            <a:lumMod val="65000"/>
+            <a:lumOff val="35000"/>
+          </a:schemeClr>
+        </a:solidFill>
+      </a:ln>
+    </cs:spPr>
+  </cs:downBar>
+  <cs:dropLine>
+    <cs:lnRef idx="0"/>
+    <cs:fillRef idx="0"/>
+    <cs:effectRef idx="0"/>
+    <cs:fontRef idx="minor">
+      <a:schemeClr val="tx1"/>
+    </cs:fontRef>
+    <cs:spPr>
+      <a:ln w="9525" cap="flat" cmpd="sng" algn="ctr">
+        <a:solidFill>
+          <a:schemeClr val="tx1">
+            <a:lumMod val="35000"/>
+            <a:lumOff val="65000"/>
+          </a:schemeClr>
+        </a:solidFill>
+        <a:round/>
+      </a:ln>
+    </cs:spPr>
+  </cs:dropLine>
+  <cs:errorBar>
+    <cs:lnRef idx="0"/>
+    <cs:fillRef idx="0"/>
+    <cs:effectRef idx="0"/>
+    <cs:fontRef idx="minor">
+      <a:schemeClr val="tx1"/>
+    </cs:fontRef>
+    <cs:spPr>
+      <a:ln w="9525" cap="flat" cmpd="sng" algn="ctr">
+        <a:solidFill>
+          <a:schemeClr val="tx1">
+            <a:lumMod val="65000"/>
+            <a:lumOff val="35000"/>
+          </a:schemeClr>
+        </a:solidFill>
+        <a:round/>
+      </a:ln>
+    </cs:spPr>
+  </cs:errorBar>
+  <cs:floor>
+    <cs:lnRef idx="0"/>
+    <cs:fillRef idx="0"/>
+    <cs:effectRef idx="0"/>
+    <cs:fontRef idx="minor">
+      <a:schemeClr val="tx1"/>
+    </cs:fontRef>
+    <cs:spPr>
+      <a:noFill/>
+      <a:ln>
+        <a:noFill/>
+      </a:ln>
+    </cs:spPr>
+  </cs:floor>
+  <cs:gridlineMajor>
+    <cs:lnRef idx="0"/>
+    <cs:fillRef idx="0"/>
+    <cs:effectRef idx="0"/>
+    <cs:fontRef idx="minor">
+      <a:schemeClr val="tx1"/>
+    </cs:fontRef>
+    <cs:spPr>
+      <a:ln w="9525" cap="flat" cmpd="sng" algn="ctr">
+        <a:solidFill>
+          <a:schemeClr val="tx1">
+            <a:lumMod val="15000"/>
+            <a:lumOff val="85000"/>
+          </a:schemeClr>
+        </a:solidFill>
+        <a:round/>
+      </a:ln>
+    </cs:spPr>
+  </cs:gridlineMajor>
+  <cs:gridlineMinor>
+    <cs:lnRef idx="0"/>
+    <cs:fillRef idx="0"/>
+    <cs:effectRef idx="0"/>
+    <cs:fontRef idx="minor">
+      <a:schemeClr val="tx1"/>
+    </cs:fontRef>
+    <cs:spPr>
+      <a:ln w="9525" cap="flat" cmpd="sng" algn="ctr">
+        <a:solidFill>
+          <a:schemeClr val="tx1">
+            <a:lumMod val="5000"/>
+            <a:lumOff val="95000"/>
+          </a:schemeClr>
+        </a:solidFill>
+        <a:round/>
+      </a:ln>
+    </cs:spPr>
+  </cs:gridlineMinor>
+  <cs:hiLoLine>
+    <cs:lnRef idx="0"/>
+    <cs:fillRef idx="0"/>
+    <cs:effectRef idx="0"/>
+    <cs:fontRef idx="minor">
+      <a:schemeClr val="tx1"/>
+    </cs:fontRef>
+    <cs:spPr>
+      <a:ln w="9525" cap="flat" cmpd="sng" algn="ctr">
+        <a:solidFill>
+          <a:schemeClr val="tx1">
+            <a:lumMod val="75000"/>
+            <a:lumOff val="25000"/>
+          </a:schemeClr>
+        </a:solidFill>
+        <a:round/>
+      </a:ln>
+    </cs:spPr>
+  </cs:hiLoLine>
+  <cs:leaderLine>
+    <cs:lnRef idx="0"/>
+    <cs:fillRef idx="0"/>
+    <cs:effectRef idx="0"/>
+    <cs:fontRef idx="minor">
+      <a:schemeClr val="tx1"/>
+    </cs:fontRef>
+    <cs:spPr>
+      <a:ln w="9525" cap="flat" cmpd="sng" algn="ctr">
+        <a:solidFill>
+          <a:schemeClr val="tx1">
+            <a:lumMod val="35000"/>
+            <a:lumOff val="65000"/>
+          </a:schemeClr>
+        </a:solidFill>
+        <a:round/>
+      </a:ln>
+    </cs:spPr>
+  </cs:leaderLine>
+  <cs:legend>
+    <cs:lnRef idx="0"/>
+    <cs:fillRef idx="0"/>
+    <cs:effectRef idx="0"/>
+    <cs:fontRef idx="minor">
+      <a:schemeClr val="tx1">
+        <a:lumMod val="65000"/>
+        <a:lumOff val="35000"/>
+      </a:schemeClr>
+    </cs:fontRef>
+    <cs:defRPr sz="1197" kern="1200"/>
+  </cs:legend>
+  <cs:plotArea mods="allowNoFillOverride allowNoLineOverride">
+    <cs:lnRef idx="0"/>
+    <cs:fillRef idx="0"/>
+    <cs:effectRef idx="0"/>
+    <cs:fontRef idx="minor">
+      <a:schemeClr val="tx1"/>
+    </cs:fontRef>
+  </cs:plotArea>
+  <cs:plotArea3D mods="allowNoFillOverride allowNoLineOverride">
+    <cs:lnRef idx="0"/>
+    <cs:fillRef idx="0"/>
+    <cs:effectRef idx="0"/>
+    <cs:fontRef idx="minor">
+      <a:schemeClr val="tx1"/>
+    </cs:fontRef>
+  </cs:plotArea3D>
+  <cs:seriesAxis>
+    <cs:lnRef idx="0"/>
+    <cs:fillRef idx="0"/>
+    <cs:effectRef idx="0"/>
+    <cs:fontRef idx="minor">
+      <a:schemeClr val="tx1">
+        <a:lumMod val="65000"/>
+        <a:lumOff val="35000"/>
+      </a:schemeClr>
+    </cs:fontRef>
+    <cs:defRPr sz="1197" kern="1200"/>
+  </cs:seriesAxis>
+  <cs:seriesLine>
+    <cs:lnRef idx="0"/>
+    <cs:fillRef idx="0"/>
+    <cs:effectRef idx="0"/>
+    <cs:fontRef idx="minor">
+      <a:schemeClr val="tx1"/>
+    </cs:fontRef>
+    <cs:spPr>
+      <a:ln w="9525" cap="flat" cmpd="sng" algn="ctr">
+        <a:solidFill>
+          <a:schemeClr val="tx1">
+            <a:lumMod val="35000"/>
+            <a:lumOff val="65000"/>
+          </a:schemeClr>
+        </a:solidFill>
+        <a:round/>
+      </a:ln>
+    </cs:spPr>
+  </cs:seriesLine>
+  <cs:title>
+    <cs:lnRef idx="0"/>
+    <cs:fillRef idx="0"/>
+    <cs:effectRef idx="0"/>
+    <cs:fontRef idx="minor">
+      <a:schemeClr val="tx1">
+        <a:lumMod val="65000"/>
+        <a:lumOff val="35000"/>
+      </a:schemeClr>
+    </cs:fontRef>
+    <cs:defRPr sz="1862" b="0" kern="1200" spc="0" baseline="0"/>
+  </cs:title>
+  <cs:trendline>
+    <cs:lnRef idx="0">
+      <cs:styleClr val="auto"/>
+    </cs:lnRef>
+    <cs:fillRef idx="0"/>
+    <cs:effectRef idx="0"/>
+    <cs:fontRef idx="minor">
+      <a:schemeClr val="tx1"/>
+    </cs:fontRef>
+    <cs:spPr>
+      <a:ln w="19050" cap="rnd">
+        <a:solidFill>
+          <a:schemeClr val="phClr"/>
+        </a:solidFill>
+        <a:prstDash val="sysDot"/>
+      </a:ln>
+    </cs:spPr>
+  </cs:trendline>
+  <cs:trendlineLabel>
+    <cs:lnRef idx="0"/>
+    <cs:fillRef idx="0"/>
+    <cs:effectRef idx="0"/>
+    <cs:fontRef idx="minor">
+      <a:schemeClr val="tx1">
+        <a:lumMod val="65000"/>
+        <a:lumOff val="35000"/>
+      </a:schemeClr>
+    </cs:fontRef>
+    <cs:defRPr sz="1197" kern="1200"/>
+  </cs:trendlineLabel>
+  <cs:upBar>
+    <cs:lnRef idx="0"/>
+    <cs:fillRef idx="0"/>
+    <cs:effectRef idx="0"/>
+    <cs:fontRef idx="minor">
+      <a:schemeClr val="dk1"/>
+    </cs:fontRef>
+    <cs:spPr>
+      <a:solidFill>
+        <a:schemeClr val="lt1"/>
+      </a:solidFill>
+      <a:ln w="9525">
+        <a:solidFill>
+          <a:schemeClr val="tx1">
+            <a:lumMod val="15000"/>
+            <a:lumOff val="85000"/>
+          </a:schemeClr>
+        </a:solidFill>
+      </a:ln>
+    </cs:spPr>
+  </cs:upBar>
+  <cs:valueAxis>
+    <cs:lnRef idx="0"/>
+    <cs:fillRef idx="0"/>
+    <cs:effectRef idx="0"/>
+    <cs:fontRef idx="minor">
+      <a:schemeClr val="tx1">
+        <a:lumMod val="65000"/>
+        <a:lumOff val="35000"/>
+      </a:schemeClr>
+    </cs:fontRef>
+    <cs:defRPr sz="1197" kern="1200"/>
+  </cs:valueAxis>
+  <cs:wall>
+    <cs:lnRef idx="0"/>
+    <cs:fillRef idx="0"/>
+    <cs:effectRef idx="0"/>
+    <cs:fontRef idx="minor">
+      <a:schemeClr val="tx1"/>
+    </cs:fontRef>
+    <cs:spPr>
+      <a:noFill/>
+      <a:ln>
+        <a:noFill/>
+      </a:ln>
+    </cs:spPr>
+  </cs:wall>
+</cs:chartStyle>
+</file>
+
+<file path=ppt/charts/style2.xml><?xml version="1.0" encoding="utf-8"?>
 <cs:chartStyle xmlns:cs="http://schemas.microsoft.com/office/drawing/2012/chartStyle" xmlns:a="http://schemas.openxmlformats.org/drawingml/2006/main" id="201">
   <cs:axisTitle>
     <cs:lnRef idx="0"/>
@@ -1045,7 +1830,7 @@
           <a:p>
             <a:fld id="{034CB48C-057A-4CE8-80E4-9559788CA0C7}" type="datetimeFigureOut">
               <a:rPr lang="pl-PL" smtClean="0"/>
-              <a:t>03.03.2018</a:t>
+              <a:t>22.08.2018</a:t>
             </a:fld>
             <a:endParaRPr lang="pl-PL"/>
           </a:p>
@@ -1243,7 +2028,7 @@
           <a:p>
             <a:fld id="{034CB48C-057A-4CE8-80E4-9559788CA0C7}" type="datetimeFigureOut">
               <a:rPr lang="pl-PL" smtClean="0"/>
-              <a:t>03.03.2018</a:t>
+              <a:t>22.08.2018</a:t>
             </a:fld>
             <a:endParaRPr lang="pl-PL"/>
           </a:p>
@@ -1451,7 +2236,7 @@
           <a:p>
             <a:fld id="{034CB48C-057A-4CE8-80E4-9559788CA0C7}" type="datetimeFigureOut">
               <a:rPr lang="pl-PL" smtClean="0"/>
-              <a:t>03.03.2018</a:t>
+              <a:t>22.08.2018</a:t>
             </a:fld>
             <a:endParaRPr lang="pl-PL"/>
           </a:p>
@@ -1649,7 +2434,7 @@
           <a:p>
             <a:fld id="{034CB48C-057A-4CE8-80E4-9559788CA0C7}" type="datetimeFigureOut">
               <a:rPr lang="pl-PL" smtClean="0"/>
-              <a:t>03.03.2018</a:t>
+              <a:t>22.08.2018</a:t>
             </a:fld>
             <a:endParaRPr lang="pl-PL"/>
           </a:p>
@@ -1924,7 +2709,7 @@
           <a:p>
             <a:fld id="{034CB48C-057A-4CE8-80E4-9559788CA0C7}" type="datetimeFigureOut">
               <a:rPr lang="pl-PL" smtClean="0"/>
-              <a:t>03.03.2018</a:t>
+              <a:t>22.08.2018</a:t>
             </a:fld>
             <a:endParaRPr lang="pl-PL"/>
           </a:p>
@@ -2189,7 +2974,7 @@
           <a:p>
             <a:fld id="{034CB48C-057A-4CE8-80E4-9559788CA0C7}" type="datetimeFigureOut">
               <a:rPr lang="pl-PL" smtClean="0"/>
-              <a:t>03.03.2018</a:t>
+              <a:t>22.08.2018</a:t>
             </a:fld>
             <a:endParaRPr lang="pl-PL"/>
           </a:p>
@@ -2601,7 +3386,7 @@
           <a:p>
             <a:fld id="{034CB48C-057A-4CE8-80E4-9559788CA0C7}" type="datetimeFigureOut">
               <a:rPr lang="pl-PL" smtClean="0"/>
-              <a:t>03.03.2018</a:t>
+              <a:t>22.08.2018</a:t>
             </a:fld>
             <a:endParaRPr lang="pl-PL"/>
           </a:p>
@@ -2742,7 +3527,7 @@
           <a:p>
             <a:fld id="{034CB48C-057A-4CE8-80E4-9559788CA0C7}" type="datetimeFigureOut">
               <a:rPr lang="pl-PL" smtClean="0"/>
-              <a:t>03.03.2018</a:t>
+              <a:t>22.08.2018</a:t>
             </a:fld>
             <a:endParaRPr lang="pl-PL"/>
           </a:p>
@@ -2855,7 +3640,7 @@
           <a:p>
             <a:fld id="{034CB48C-057A-4CE8-80E4-9559788CA0C7}" type="datetimeFigureOut">
               <a:rPr lang="pl-PL" smtClean="0"/>
-              <a:t>03.03.2018</a:t>
+              <a:t>22.08.2018</a:t>
             </a:fld>
             <a:endParaRPr lang="pl-PL"/>
           </a:p>
@@ -3166,7 +3951,7 @@
           <a:p>
             <a:fld id="{034CB48C-057A-4CE8-80E4-9559788CA0C7}" type="datetimeFigureOut">
               <a:rPr lang="pl-PL" smtClean="0"/>
-              <a:t>03.03.2018</a:t>
+              <a:t>22.08.2018</a:t>
             </a:fld>
             <a:endParaRPr lang="pl-PL"/>
           </a:p>
@@ -3454,7 +4239,7 @@
           <a:p>
             <a:fld id="{034CB48C-057A-4CE8-80E4-9559788CA0C7}" type="datetimeFigureOut">
               <a:rPr lang="pl-PL" smtClean="0"/>
-              <a:t>03.03.2018</a:t>
+              <a:t>22.08.2018</a:t>
             </a:fld>
             <a:endParaRPr lang="pl-PL"/>
           </a:p>
@@ -3695,7 +4480,7 @@
           <a:p>
             <a:fld id="{034CB48C-057A-4CE8-80E4-9559788CA0C7}" type="datetimeFigureOut">
               <a:rPr lang="pl-PL" smtClean="0"/>
-              <a:t>03.03.2018</a:t>
+              <a:t>22.08.2018</a:t>
             </a:fld>
             <a:endParaRPr lang="pl-PL"/>
           </a:p>
@@ -4140,6 +4925,34 @@
           </a:graphicData>
         </a:graphic>
       </p:graphicFrame>
+      <p:graphicFrame>
+        <p:nvGraphicFramePr>
+          <p:cNvPr id="7" name="Wykres 5">
+            <a:extLst>
+              <a:ext uri="{FF2B5EF4-FFF2-40B4-BE49-F238E27FC236}">
+                <a16:creationId xmlns:a16="http://schemas.microsoft.com/office/drawing/2014/main" id="{51B7B5C0-1953-4BC1-B104-932675238EEE}"/>
+              </a:ext>
+            </a:extLst>
+          </p:cNvPr>
+          <p:cNvGraphicFramePr/>
+          <p:nvPr>
+            <p:extLst>
+              <p:ext uri="{D42A27DB-BD31-4B8C-83A1-F6EECF244321}">
+                <p14:modId xmlns:p14="http://schemas.microsoft.com/office/powerpoint/2010/main" val="3639183836"/>
+              </p:ext>
+            </p:extLst>
+          </p:nvPr>
+        </p:nvGraphicFramePr>
+        <p:xfrm>
+          <a:off x="4965849" y="3773276"/>
+          <a:ext cx="2260301" cy="2582734"/>
+        </p:xfrm>
+        <a:graphic>
+          <a:graphicData uri="http://schemas.openxmlformats.org/drawingml/2006/chart">
+            <c:chart xmlns:c="http://schemas.openxmlformats.org/drawingml/2006/chart" xmlns:r="http://schemas.openxmlformats.org/officeDocument/2006/relationships" r:id="rId3"/>
+          </a:graphicData>
+        </a:graphic>
+      </p:graphicFrame>
     </p:spTree>
     <p:extLst>
       <p:ext uri="{BB962C8B-B14F-4D97-AF65-F5344CB8AC3E}">

</xml_diff>